<commit_message>
Fixed arch diagram with AWS Cloud box
</commit_message>
<xml_diff>
--- a/docs/deployment_guide/images/nvidia-chem-architecture-diagram.pptx
+++ b/docs/deployment_guide/images/nvidia-chem-architecture-diagram.pptx
@@ -259,7 +259,7 @@
           <a:p>
             <a:fld id="{10EEF6A4-9017-AA41-B724-716C121CC8DF}" type="datetimeFigureOut">
               <a:rPr lang="en-US" smtClean="0"/>
-              <a:t>4/25/2022</a:t>
+              <a:t>6/17/2022</a:t>
             </a:fld>
             <a:endParaRPr lang="en-US"/>
           </a:p>
@@ -457,7 +457,7 @@
           <a:p>
             <a:fld id="{10EEF6A4-9017-AA41-B724-716C121CC8DF}" type="datetimeFigureOut">
               <a:rPr lang="en-US" smtClean="0"/>
-              <a:t>4/25/2022</a:t>
+              <a:t>6/17/2022</a:t>
             </a:fld>
             <a:endParaRPr lang="en-US"/>
           </a:p>
@@ -665,7 +665,7 @@
           <a:p>
             <a:fld id="{10EEF6A4-9017-AA41-B724-716C121CC8DF}" type="datetimeFigureOut">
               <a:rPr lang="en-US" smtClean="0"/>
-              <a:t>4/25/2022</a:t>
+              <a:t>6/17/2022</a:t>
             </a:fld>
             <a:endParaRPr lang="en-US"/>
           </a:p>
@@ -863,7 +863,7 @@
           <a:p>
             <a:fld id="{10EEF6A4-9017-AA41-B724-716C121CC8DF}" type="datetimeFigureOut">
               <a:rPr lang="en-US" smtClean="0"/>
-              <a:t>4/25/2022</a:t>
+              <a:t>6/17/2022</a:t>
             </a:fld>
             <a:endParaRPr lang="en-US"/>
           </a:p>
@@ -1138,7 +1138,7 @@
           <a:p>
             <a:fld id="{10EEF6A4-9017-AA41-B724-716C121CC8DF}" type="datetimeFigureOut">
               <a:rPr lang="en-US" smtClean="0"/>
-              <a:t>4/25/2022</a:t>
+              <a:t>6/17/2022</a:t>
             </a:fld>
             <a:endParaRPr lang="en-US"/>
           </a:p>
@@ -1403,7 +1403,7 @@
           <a:p>
             <a:fld id="{10EEF6A4-9017-AA41-B724-716C121CC8DF}" type="datetimeFigureOut">
               <a:rPr lang="en-US" smtClean="0"/>
-              <a:t>4/25/2022</a:t>
+              <a:t>6/17/2022</a:t>
             </a:fld>
             <a:endParaRPr lang="en-US"/>
           </a:p>
@@ -1815,7 +1815,7 @@
           <a:p>
             <a:fld id="{10EEF6A4-9017-AA41-B724-716C121CC8DF}" type="datetimeFigureOut">
               <a:rPr lang="en-US" smtClean="0"/>
-              <a:t>4/25/2022</a:t>
+              <a:t>6/17/2022</a:t>
             </a:fld>
             <a:endParaRPr lang="en-US"/>
           </a:p>
@@ -1956,7 +1956,7 @@
           <a:p>
             <a:fld id="{10EEF6A4-9017-AA41-B724-716C121CC8DF}" type="datetimeFigureOut">
               <a:rPr lang="en-US" smtClean="0"/>
-              <a:t>4/25/2022</a:t>
+              <a:t>6/17/2022</a:t>
             </a:fld>
             <a:endParaRPr lang="en-US"/>
           </a:p>
@@ -2069,7 +2069,7 @@
           <a:p>
             <a:fld id="{10EEF6A4-9017-AA41-B724-716C121CC8DF}" type="datetimeFigureOut">
               <a:rPr lang="en-US" smtClean="0"/>
-              <a:t>4/25/2022</a:t>
+              <a:t>6/17/2022</a:t>
             </a:fld>
             <a:endParaRPr lang="en-US"/>
           </a:p>
@@ -2380,7 +2380,7 @@
           <a:p>
             <a:fld id="{10EEF6A4-9017-AA41-B724-716C121CC8DF}" type="datetimeFigureOut">
               <a:rPr lang="en-US" smtClean="0"/>
-              <a:t>4/25/2022</a:t>
+              <a:t>6/17/2022</a:t>
             </a:fld>
             <a:endParaRPr lang="en-US"/>
           </a:p>
@@ -2668,7 +2668,7 @@
           <a:p>
             <a:fld id="{10EEF6A4-9017-AA41-B724-716C121CC8DF}" type="datetimeFigureOut">
               <a:rPr lang="en-US" smtClean="0"/>
-              <a:t>4/25/2022</a:t>
+              <a:t>6/17/2022</a:t>
             </a:fld>
             <a:endParaRPr lang="en-US"/>
           </a:p>
@@ -2909,7 +2909,7 @@
           <a:p>
             <a:fld id="{10EEF6A4-9017-AA41-B724-716C121CC8DF}" type="datetimeFigureOut">
               <a:rPr lang="en-US" smtClean="0"/>
-              <a:t>4/25/2022</a:t>
+              <a:t>6/17/2022</a:t>
             </a:fld>
             <a:endParaRPr lang="en-US"/>
           </a:p>
@@ -3498,112 +3498,6 @@
       </p:sp>
       <p:sp>
         <p:nvSpPr>
-          <p:cNvPr id="4" name="Rectangle 3">
-            <a:extLst>
-              <a:ext uri="{FF2B5EF4-FFF2-40B4-BE49-F238E27FC236}">
-                <a16:creationId xmlns:a16="http://schemas.microsoft.com/office/drawing/2014/main" id="{0BDFC323-36D2-7F4C-A5F8-E19E6A005086}"/>
-              </a:ext>
-            </a:extLst>
-          </p:cNvPr>
-          <p:cNvSpPr/>
-          <p:nvPr/>
-        </p:nvSpPr>
-        <p:spPr>
-          <a:xfrm>
-            <a:off x="84881" y="92597"/>
-            <a:ext cx="11297494" cy="6151582"/>
-          </a:xfrm>
-          <a:prstGeom prst="rect">
-            <a:avLst/>
-          </a:prstGeom>
-          <a:noFill/>
-          <a:ln w="12700">
-            <a:solidFill>
-              <a:srgbClr val="5B9CD5"/>
-            </a:solidFill>
-            <a:prstDash val="sysDash"/>
-          </a:ln>
-        </p:spPr>
-        <p:style>
-          <a:lnRef idx="2">
-            <a:schemeClr val="accent1">
-              <a:shade val="50000"/>
-            </a:schemeClr>
-          </a:lnRef>
-          <a:fillRef idx="1">
-            <a:schemeClr val="accent1"/>
-          </a:fillRef>
-          <a:effectRef idx="0">
-            <a:schemeClr val="accent1"/>
-          </a:effectRef>
-          <a:fontRef idx="minor">
-            <a:schemeClr val="lt1"/>
-          </a:fontRef>
-        </p:style>
-        <p:txBody>
-          <a:bodyPr lIns="502920" tIns="91440"/>
-          <a:lstStyle/>
-          <a:p>
-            <a:pPr eaLnBrk="1" fontAlgn="auto" hangingPunct="1">
-              <a:spcBef>
-                <a:spcPts val="0"/>
-              </a:spcBef>
-              <a:spcAft>
-                <a:spcPts val="0"/>
-              </a:spcAft>
-              <a:defRPr/>
-            </a:pPr>
-            <a:r>
-              <a:rPr lang="en-US" sz="1200" dirty="0">
-                <a:solidFill>
-                  <a:srgbClr val="5B9CD5"/>
-                </a:solidFill>
-                <a:latin typeface="Arial" panose="020B0604020202020204" pitchFamily="34" charset="0"/>
-                <a:cs typeface="Arial" panose="020B0604020202020204" pitchFamily="34" charset="0"/>
-              </a:rPr>
-              <a:t>Region</a:t>
-            </a:r>
-          </a:p>
-        </p:txBody>
-      </p:sp>
-      <p:pic>
-        <p:nvPicPr>
-          <p:cNvPr id="5" name="Graphic 4">
-            <a:extLst>
-              <a:ext uri="{FF2B5EF4-FFF2-40B4-BE49-F238E27FC236}">
-                <a16:creationId xmlns:a16="http://schemas.microsoft.com/office/drawing/2014/main" id="{4115E2BF-9026-E84B-99EB-FBF1AB0A2866}"/>
-              </a:ext>
-            </a:extLst>
-          </p:cNvPr>
-          <p:cNvPicPr>
-            <a:picLocks noChangeAspect="1"/>
-          </p:cNvPicPr>
-          <p:nvPr/>
-        </p:nvPicPr>
-        <p:blipFill>
-          <a:blip r:embed="rId2">
-            <a:extLst>
-              <a:ext uri="{96DAC541-7B7A-43D3-8B79-37D633B846F1}">
-                <asvg:svgBlip xmlns:asvg="http://schemas.microsoft.com/office/drawing/2016/SVG/main" r:embed="rId3"/>
-              </a:ext>
-            </a:extLst>
-          </a:blip>
-          <a:stretch>
-            <a:fillRect/>
-          </a:stretch>
-        </p:blipFill>
-        <p:spPr>
-          <a:xfrm>
-            <a:off x="84881" y="92597"/>
-            <a:ext cx="381000" cy="381000"/>
-          </a:xfrm>
-          <a:prstGeom prst="rect">
-            <a:avLst/>
-          </a:prstGeom>
-        </p:spPr>
-      </p:pic>
-      <p:sp>
-        <p:nvSpPr>
           <p:cNvPr id="6" name="Rectangle 5">
             <a:extLst>
               <a:ext uri="{FF2B5EF4-FFF2-40B4-BE49-F238E27FC236}">
@@ -3757,10 +3651,10 @@
           <p:nvPr/>
         </p:nvPicPr>
         <p:blipFill>
-          <a:blip r:embed="rId4">
+          <a:blip r:embed="rId2">
             <a:extLst>
               <a:ext uri="{96DAC541-7B7A-43D3-8B79-37D633B846F1}">
-                <asvg:svgBlip xmlns:asvg="http://schemas.microsoft.com/office/drawing/2016/SVG/main" r:embed="rId5"/>
+                <asvg:svgBlip xmlns:asvg="http://schemas.microsoft.com/office/drawing/2016/SVG/main" r:embed="rId3"/>
               </a:ext>
             </a:extLst>
           </a:blip>
@@ -3865,10 +3759,10 @@
           <p:nvPr/>
         </p:nvPicPr>
         <p:blipFill>
-          <a:blip r:embed="rId6">
+          <a:blip r:embed="rId4">
             <a:extLst>
               <a:ext uri="{96DAC541-7B7A-43D3-8B79-37D633B846F1}">
-                <asvg:svgBlip xmlns:asvg="http://schemas.microsoft.com/office/drawing/2016/SVG/main" r:embed="rId7"/>
+                <asvg:svgBlip xmlns:asvg="http://schemas.microsoft.com/office/drawing/2016/SVG/main" r:embed="rId5"/>
               </a:ext>
             </a:extLst>
           </a:blip>
@@ -3973,10 +3867,10 @@
           <p:nvPr/>
         </p:nvPicPr>
         <p:blipFill>
-          <a:blip r:embed="rId8">
+          <a:blip r:embed="rId6">
             <a:extLst>
               <a:ext uri="{96DAC541-7B7A-43D3-8B79-37D633B846F1}">
-                <asvg:svgBlip xmlns:asvg="http://schemas.microsoft.com/office/drawing/2016/SVG/main" r:embed="rId9"/>
+                <asvg:svgBlip xmlns:asvg="http://schemas.microsoft.com/office/drawing/2016/SVG/main" r:embed="rId7"/>
               </a:ext>
             </a:extLst>
           </a:blip>
@@ -4009,10 +3903,10 @@
           <p:nvPr/>
         </p:nvPicPr>
         <p:blipFill>
-          <a:blip r:embed="rId10">
+          <a:blip r:embed="rId8">
             <a:extLst>
               <a:ext uri="{96DAC541-7B7A-43D3-8B79-37D633B846F1}">
-                <asvg:svgBlip xmlns:asvg="http://schemas.microsoft.com/office/drawing/2016/SVG/main" r:embed="rId11"/>
+                <asvg:svgBlip xmlns:asvg="http://schemas.microsoft.com/office/drawing/2016/SVG/main" r:embed="rId9"/>
               </a:ext>
             </a:extLst>
           </a:blip>
@@ -5833,7 +5727,7 @@
           <p:nvPr/>
         </p:nvPicPr>
         <p:blipFill>
-          <a:blip r:embed="rId12">
+          <a:blip r:embed="rId10">
             <a:extLst>
               <a:ext uri="{28A0092B-C50C-407E-A947-70E740481C1C}">
                 <a14:useLocalDpi xmlns:a14="http://schemas.microsoft.com/office/drawing/2010/main" val="0"/>
@@ -5893,7 +5787,7 @@
           <p:nvPr/>
         </p:nvPicPr>
         <p:blipFill>
-          <a:blip r:embed="rId13">
+          <a:blip r:embed="rId11">
             <a:extLst>
               <a:ext uri="{28A0092B-C50C-407E-A947-70E740481C1C}">
                 <a14:useLocalDpi xmlns:a14="http://schemas.microsoft.com/office/drawing/2010/main" val="0"/>
@@ -5953,7 +5847,7 @@
           <p:nvPr/>
         </p:nvPicPr>
         <p:blipFill>
-          <a:blip r:embed="rId14">
+          <a:blip r:embed="rId12">
             <a:extLst>
               <a:ext uri="{28A0092B-C50C-407E-A947-70E740481C1C}">
                 <a14:useLocalDpi xmlns:a14="http://schemas.microsoft.com/office/drawing/2010/main" val="0"/>
@@ -6013,10 +5907,10 @@
           <p:nvPr/>
         </p:nvPicPr>
         <p:blipFill>
-          <a:blip r:embed="rId15">
+          <a:blip r:embed="rId13">
             <a:extLst>
               <a:ext uri="{96DAC541-7B7A-43D3-8B79-37D633B846F1}">
-                <asvg:svgBlip xmlns:asvg="http://schemas.microsoft.com/office/drawing/2016/SVG/main" r:embed="rId16"/>
+                <asvg:svgBlip xmlns:asvg="http://schemas.microsoft.com/office/drawing/2016/SVG/main" r:embed="rId14"/>
               </a:ext>
             </a:extLst>
           </a:blip>
@@ -6071,7 +5965,7 @@
           <p:nvPr/>
         </p:nvPicPr>
         <p:blipFill>
-          <a:blip r:embed="rId17">
+          <a:blip r:embed="rId15">
             <a:extLst>
               <a:ext uri="{28A0092B-C50C-407E-A947-70E740481C1C}">
                 <a14:useLocalDpi xmlns:a14="http://schemas.microsoft.com/office/drawing/2010/main" val="0"/>
@@ -6131,7 +6025,7 @@
           <p:nvPr/>
         </p:nvPicPr>
         <p:blipFill>
-          <a:blip r:embed="rId17">
+          <a:blip r:embed="rId15">
             <a:extLst>
               <a:ext uri="{28A0092B-C50C-407E-A947-70E740481C1C}">
                 <a14:useLocalDpi xmlns:a14="http://schemas.microsoft.com/office/drawing/2010/main" val="0"/>
@@ -6191,7 +6085,7 @@
           <p:nvPr/>
         </p:nvPicPr>
         <p:blipFill>
-          <a:blip r:embed="rId18">
+          <a:blip r:embed="rId16">
             <a:extLst>
               <a:ext uri="{28A0092B-C50C-407E-A947-70E740481C1C}">
                 <a14:useLocalDpi xmlns:a14="http://schemas.microsoft.com/office/drawing/2010/main" val="0"/>
@@ -6251,7 +6145,7 @@
           <p:nvPr/>
         </p:nvPicPr>
         <p:blipFill>
-          <a:blip r:embed="rId18">
+          <a:blip r:embed="rId16">
             <a:extLst>
               <a:ext uri="{28A0092B-C50C-407E-A947-70E740481C1C}">
                 <a14:useLocalDpi xmlns:a14="http://schemas.microsoft.com/office/drawing/2010/main" val="0"/>
@@ -6311,7 +6205,7 @@
           <p:nvPr/>
         </p:nvPicPr>
         <p:blipFill>
-          <a:blip r:embed="rId19">
+          <a:blip r:embed="rId17">
             <a:extLst>
               <a:ext uri="{28A0092B-C50C-407E-A947-70E740481C1C}">
                 <a14:useLocalDpi xmlns:a14="http://schemas.microsoft.com/office/drawing/2010/main" val="0"/>
@@ -6371,7 +6265,7 @@
           <p:nvPr/>
         </p:nvPicPr>
         <p:blipFill>
-          <a:blip r:embed="rId19">
+          <a:blip r:embed="rId17">
             <a:extLst>
               <a:ext uri="{28A0092B-C50C-407E-A947-70E740481C1C}">
                 <a14:useLocalDpi xmlns:a14="http://schemas.microsoft.com/office/drawing/2010/main" val="0"/>
@@ -6431,7 +6325,7 @@
           <p:nvPr/>
         </p:nvPicPr>
         <p:blipFill>
-          <a:blip r:embed="rId20">
+          <a:blip r:embed="rId18">
             <a:extLst>
               <a:ext uri="{28A0092B-C50C-407E-A947-70E740481C1C}">
                 <a14:useLocalDpi xmlns:a14="http://schemas.microsoft.com/office/drawing/2010/main" val="0"/>
@@ -6491,7 +6385,7 @@
           <p:nvPr/>
         </p:nvPicPr>
         <p:blipFill>
-          <a:blip r:embed="rId21">
+          <a:blip r:embed="rId19">
             <a:extLst>
               <a:ext uri="{28A0092B-C50C-407E-A947-70E740481C1C}">
                 <a14:useLocalDpi xmlns:a14="http://schemas.microsoft.com/office/drawing/2010/main" val="0"/>
@@ -6551,7 +6445,7 @@
           <p:nvPr/>
         </p:nvPicPr>
         <p:blipFill>
-          <a:blip r:embed="rId22">
+          <a:blip r:embed="rId20">
             <a:extLst>
               <a:ext uri="{28A0092B-C50C-407E-A947-70E740481C1C}">
                 <a14:useLocalDpi xmlns:a14="http://schemas.microsoft.com/office/drawing/2010/main" val="0"/>
@@ -6683,10 +6577,10 @@
           <p:nvPr/>
         </p:nvPicPr>
         <p:blipFill>
-          <a:blip r:embed="rId6">
+          <a:blip r:embed="rId4">
             <a:extLst>
               <a:ext uri="{96DAC541-7B7A-43D3-8B79-37D633B846F1}">
-                <asvg:svgBlip xmlns:asvg="http://schemas.microsoft.com/office/drawing/2016/SVG/main" r:embed="rId7"/>
+                <asvg:svgBlip xmlns:asvg="http://schemas.microsoft.com/office/drawing/2016/SVG/main" r:embed="rId5"/>
               </a:ext>
             </a:extLst>
           </a:blip>
@@ -6758,7 +6652,7 @@
           <p:nvPr/>
         </p:nvPicPr>
         <p:blipFill>
-          <a:blip r:embed="rId12">
+          <a:blip r:embed="rId10">
             <a:extLst>
               <a:ext uri="{28A0092B-C50C-407E-A947-70E740481C1C}">
                 <a14:useLocalDpi xmlns:a14="http://schemas.microsoft.com/office/drawing/2010/main" val="0"/>
@@ -6890,10 +6784,10 @@
           <p:nvPr/>
         </p:nvPicPr>
         <p:blipFill>
-          <a:blip r:embed="rId8">
+          <a:blip r:embed="rId6">
             <a:extLst>
               <a:ext uri="{96DAC541-7B7A-43D3-8B79-37D633B846F1}">
-                <asvg:svgBlip xmlns:asvg="http://schemas.microsoft.com/office/drawing/2016/SVG/main" r:embed="rId9"/>
+                <asvg:svgBlip xmlns:asvg="http://schemas.microsoft.com/office/drawing/2016/SVG/main" r:embed="rId7"/>
               </a:ext>
             </a:extLst>
           </a:blip>
@@ -7731,10 +7625,10 @@
           <p:nvPr/>
         </p:nvPicPr>
         <p:blipFill>
-          <a:blip r:embed="rId15">
+          <a:blip r:embed="rId13">
             <a:extLst>
               <a:ext uri="{96DAC541-7B7A-43D3-8B79-37D633B846F1}">
-                <asvg:svgBlip xmlns:asvg="http://schemas.microsoft.com/office/drawing/2016/SVG/main" r:embed="rId16"/>
+                <asvg:svgBlip xmlns:asvg="http://schemas.microsoft.com/office/drawing/2016/SVG/main" r:embed="rId14"/>
               </a:ext>
             </a:extLst>
           </a:blip>
@@ -7789,7 +7683,7 @@
           <p:nvPr/>
         </p:nvPicPr>
         <p:blipFill>
-          <a:blip r:embed="rId17">
+          <a:blip r:embed="rId15">
             <a:extLst>
               <a:ext uri="{28A0092B-C50C-407E-A947-70E740481C1C}">
                 <a14:useLocalDpi xmlns:a14="http://schemas.microsoft.com/office/drawing/2010/main" val="0"/>
@@ -7849,7 +7743,7 @@
           <p:nvPr/>
         </p:nvPicPr>
         <p:blipFill>
-          <a:blip r:embed="rId17">
+          <a:blip r:embed="rId15">
             <a:extLst>
               <a:ext uri="{28A0092B-C50C-407E-A947-70E740481C1C}">
                 <a14:useLocalDpi xmlns:a14="http://schemas.microsoft.com/office/drawing/2010/main" val="0"/>
@@ -7909,7 +7803,7 @@
           <p:nvPr/>
         </p:nvPicPr>
         <p:blipFill>
-          <a:blip r:embed="rId18">
+          <a:blip r:embed="rId16">
             <a:extLst>
               <a:ext uri="{28A0092B-C50C-407E-A947-70E740481C1C}">
                 <a14:useLocalDpi xmlns:a14="http://schemas.microsoft.com/office/drawing/2010/main" val="0"/>
@@ -7969,7 +7863,7 @@
           <p:nvPr/>
         </p:nvPicPr>
         <p:blipFill>
-          <a:blip r:embed="rId18">
+          <a:blip r:embed="rId16">
             <a:extLst>
               <a:ext uri="{28A0092B-C50C-407E-A947-70E740481C1C}">
                 <a14:useLocalDpi xmlns:a14="http://schemas.microsoft.com/office/drawing/2010/main" val="0"/>
@@ -8222,7 +8116,7 @@
           <p:nvPr/>
         </p:nvPicPr>
         <p:blipFill>
-          <a:blip r:embed="rId23">
+          <a:blip r:embed="rId21">
             <a:extLst>
               <a:ext uri="{28A0092B-C50C-407E-A947-70E740481C1C}">
                 <a14:useLocalDpi xmlns:a14="http://schemas.microsoft.com/office/drawing/2010/main" val="0"/>
@@ -8265,6 +8159,110 @@
               </a14:hiddenLine>
             </a:ext>
           </a:extLst>
+        </p:spPr>
+      </p:pic>
+      <p:sp>
+        <p:nvSpPr>
+          <p:cNvPr id="63" name="Rectangle 62">
+            <a:extLst>
+              <a:ext uri="{FF2B5EF4-FFF2-40B4-BE49-F238E27FC236}">
+                <a16:creationId xmlns:a16="http://schemas.microsoft.com/office/drawing/2014/main" id="{2B1388E6-F617-42B7-AAC1-8CDB219B53F9}"/>
+              </a:ext>
+            </a:extLst>
+          </p:cNvPr>
+          <p:cNvSpPr/>
+          <p:nvPr/>
+        </p:nvSpPr>
+        <p:spPr bwMode="auto">
+          <a:xfrm>
+            <a:off x="116897" y="188272"/>
+            <a:ext cx="11349090" cy="5975610"/>
+          </a:xfrm>
+          <a:prstGeom prst="rect">
+            <a:avLst/>
+          </a:prstGeom>
+          <a:noFill/>
+          <a:ln w="12700">
+            <a:solidFill>
+              <a:schemeClr val="tx1"/>
+            </a:solidFill>
+          </a:ln>
+        </p:spPr>
+        <p:style>
+          <a:lnRef idx="2">
+            <a:schemeClr val="accent1">
+              <a:shade val="50000"/>
+            </a:schemeClr>
+          </a:lnRef>
+          <a:fillRef idx="1">
+            <a:schemeClr val="accent1"/>
+          </a:fillRef>
+          <a:effectRef idx="0">
+            <a:schemeClr val="accent1"/>
+          </a:effectRef>
+          <a:fontRef idx="minor">
+            <a:schemeClr val="lt1"/>
+          </a:fontRef>
+        </p:style>
+        <p:txBody>
+          <a:bodyPr lIns="502920" tIns="91440"/>
+          <a:lstStyle/>
+          <a:p>
+            <a:pPr eaLnBrk="1" fontAlgn="auto" hangingPunct="1">
+              <a:spcBef>
+                <a:spcPts val="0"/>
+              </a:spcBef>
+              <a:spcAft>
+                <a:spcPts val="0"/>
+              </a:spcAft>
+              <a:defRPr/>
+            </a:pPr>
+            <a:r>
+              <a:rPr lang="en-US" sz="1200" dirty="0">
+                <a:solidFill>
+                  <a:sysClr val="windowText" lastClr="000000"/>
+                </a:solidFill>
+                <a:latin typeface="Arial" panose="020B0604020202020204" pitchFamily="34" charset="0"/>
+                <a:cs typeface="Arial" panose="020B0604020202020204" pitchFamily="34" charset="0"/>
+              </a:rPr>
+              <a:t>AWS Cloud</a:t>
+            </a:r>
+          </a:p>
+        </p:txBody>
+      </p:sp>
+      <p:pic>
+        <p:nvPicPr>
+          <p:cNvPr id="69" name="Graphic 68">
+            <a:extLst>
+              <a:ext uri="{FF2B5EF4-FFF2-40B4-BE49-F238E27FC236}">
+                <a16:creationId xmlns:a16="http://schemas.microsoft.com/office/drawing/2014/main" id="{01D144EF-D3BE-4EDB-BB5D-FC4C23BB595C}"/>
+              </a:ext>
+            </a:extLst>
+          </p:cNvPr>
+          <p:cNvPicPr>
+            <a:picLocks noChangeAspect="1"/>
+          </p:cNvPicPr>
+          <p:nvPr/>
+        </p:nvPicPr>
+        <p:blipFill>
+          <a:blip r:embed="rId22">
+            <a:extLst>
+              <a:ext uri="{96DAC541-7B7A-43D3-8B79-37D633B846F1}">
+                <asvg:svgBlip xmlns:asvg="http://schemas.microsoft.com/office/drawing/2016/SVG/main" r:embed="rId23"/>
+              </a:ext>
+            </a:extLst>
+          </a:blip>
+          <a:srcRect/>
+          <a:stretch/>
+        </p:blipFill>
+        <p:spPr>
+          <a:xfrm>
+            <a:off x="116897" y="188272"/>
+            <a:ext cx="381000" cy="381000"/>
+          </a:xfrm>
+          <a:prstGeom prst="rect">
+            <a:avLst/>
+          </a:prstGeom>
         </p:spPr>
       </p:pic>
     </p:spTree>

</xml_diff>